<commit_message>
SEIR model i doku progress
</commit_message>
<xml_diff>
--- a/doku/Presentation.pptx
+++ b/doku/Presentation.pptx
@@ -10,6 +10,7 @@
     <p:sldId id="258" r:id="rId4"/>
     <p:sldId id="261" r:id="rId5"/>
     <p:sldId id="260" r:id="rId6"/>
+    <p:sldId id="262" r:id="rId7"/>
   </p:sldIdLst>
   <p:sldSz cx="9144000" cy="6858000" type="screen4x3"/>
   <p:notesSz cx="6858000" cy="9144000"/>
@@ -3927,13 +3928,8 @@
             </a:r>
             <a:r>
               <a:rPr lang="pl-PL" dirty="0" smtClean="0"/>
-              <a:t>: Marcin </a:t>
-            </a:r>
-            <a:r>
-              <a:rPr lang="pl-PL" dirty="0" smtClean="0"/>
-              <a:t>Jędrzejczyk</a:t>
-            </a:r>
-            <a:endParaRPr lang="pl-PL" dirty="0" smtClean="0"/>
+              <a:t>: Marcin Jędrzejczyk</a:t>
+            </a:r>
           </a:p>
           <a:p>
             <a:r>
@@ -3942,11 +3938,7 @@
             </a:r>
             <a:r>
               <a:rPr lang="pl-PL" dirty="0" smtClean="0"/>
-              <a:t>: Dr hab. </a:t>
-            </a:r>
-            <a:r>
-              <a:rPr lang="pl-PL" dirty="0" smtClean="0"/>
-              <a:t>inż. Jarosław Wąs</a:t>
+              <a:t>: Dr hab. inż. Jarosław Wąs</a:t>
             </a:r>
             <a:endParaRPr lang="pl-PL" dirty="0"/>
           </a:p>
@@ -4103,7 +4095,6 @@
               <a:rPr lang="pl-PL" dirty="0" smtClean="0"/>
               <a:t>”</a:t>
             </a:r>
-            <a:endParaRPr lang="pl-PL" dirty="0" smtClean="0"/>
           </a:p>
           <a:p>
             <a:pPr>
@@ -4129,21 +4120,8 @@
             </a:r>
             <a:r>
               <a:rPr lang="pl-PL" dirty="0" smtClean="0"/>
-              <a:t> </a:t>
-            </a:r>
-            <a:r>
-              <a:rPr lang="pl-PL" dirty="0" smtClean="0"/>
-              <a:t>– </a:t>
-            </a:r>
-            <a:r>
-              <a:rPr lang="pl-PL" dirty="0" smtClean="0"/>
-              <a:t>22,101,100 to </a:t>
-            </a:r>
-            <a:r>
-              <a:rPr lang="pl-PL" dirty="0" smtClean="0"/>
-              <a:t>23,665,873</a:t>
-            </a:r>
-            <a:endParaRPr lang="pl-PL" dirty="0" smtClean="0"/>
+              <a:t> – 22,101,100 to 23,665,873</a:t>
+            </a:r>
           </a:p>
           <a:p>
             <a:pPr>
@@ -4183,21 +4161,12 @@
             </a:r>
             <a:r>
               <a:rPr lang="en-US" dirty="0" smtClean="0"/>
-              <a:t>current </a:t>
-            </a:r>
-            <a:r>
-              <a:rPr lang="en-US" dirty="0" smtClean="0"/>
-              <a:t>estimates say 50—100 </a:t>
-            </a:r>
-            <a:r>
-              <a:rPr lang="en-US" dirty="0" smtClean="0"/>
-              <a:t>million</a:t>
+              <a:t>current estimates say 50—100 million</a:t>
             </a:r>
             <a:r>
               <a:rPr lang="pl-PL" dirty="0" smtClean="0"/>
               <a:t>)</a:t>
             </a:r>
-            <a:endParaRPr lang="pl-PL" dirty="0" smtClean="0"/>
           </a:p>
           <a:p>
             <a:endParaRPr lang="pl-PL" dirty="0" smtClean="0"/>
@@ -4284,15 +4253,7 @@
             </a:r>
             <a:r>
               <a:rPr lang="en-US" dirty="0" smtClean="0"/>
-              <a:t> understand </a:t>
-            </a:r>
-            <a:r>
-              <a:rPr lang="en-US" dirty="0" smtClean="0"/>
-              <a:t>how epidemic behave in </a:t>
-            </a:r>
-            <a:r>
-              <a:rPr lang="en-US" dirty="0" smtClean="0"/>
-              <a:t>time</a:t>
+              <a:t> understand how epidemic behave in time</a:t>
             </a:r>
             <a:endParaRPr lang="pl-PL" dirty="0" smtClean="0"/>
           </a:p>
@@ -4311,15 +4272,7 @@
             </a:r>
             <a:r>
               <a:rPr lang="en-US" dirty="0" smtClean="0"/>
-              <a:t> </a:t>
-            </a:r>
-            <a:r>
-              <a:rPr lang="en-US" dirty="0" smtClean="0"/>
-              <a:t>quickly it spreads depending </a:t>
-            </a:r>
-            <a:r>
-              <a:rPr lang="en-US" dirty="0" smtClean="0"/>
-              <a:t>on</a:t>
+              <a:t> quickly it spreads depending on</a:t>
             </a:r>
             <a:r>
               <a:rPr lang="pl-PL" dirty="0" smtClean="0"/>
@@ -4346,15 +4299,7 @@
             </a:r>
             <a:r>
               <a:rPr lang="en-US" dirty="0" smtClean="0"/>
-              <a:t> </a:t>
-            </a:r>
-            <a:r>
-              <a:rPr lang="en-US" dirty="0" smtClean="0"/>
-              <a:t>how vaccination </a:t>
-            </a:r>
-            <a:r>
-              <a:rPr lang="en-US" dirty="0" smtClean="0"/>
-              <a:t>a</a:t>
+              <a:t> how vaccination a</a:t>
             </a:r>
             <a:r>
               <a:rPr lang="pl-PL" dirty="0" err="1" smtClean="0"/>
@@ -4374,15 +4319,7 @@
             </a:r>
             <a:r>
               <a:rPr lang="en-US" dirty="0" smtClean="0"/>
-              <a:t>spreading </a:t>
-            </a:r>
-            <a:r>
-              <a:rPr lang="en-US" dirty="0" smtClean="0"/>
-              <a:t>and </a:t>
-            </a:r>
-            <a:r>
-              <a:rPr lang="en-US" dirty="0" smtClean="0"/>
-              <a:t>con</a:t>
+              <a:t>spreading and con</a:t>
             </a:r>
             <a:r>
               <a:rPr lang="pl-PL" dirty="0" smtClean="0"/>
@@ -4394,11 +4331,7 @@
             </a:r>
             <a:r>
               <a:rPr lang="en-US" dirty="0" smtClean="0"/>
-              <a:t> </a:t>
-            </a:r>
-            <a:r>
-              <a:rPr lang="en-US" dirty="0" smtClean="0"/>
-              <a:t>that herd immunity is important</a:t>
+              <a:t> that herd immunity is important</a:t>
             </a:r>
             <a:endParaRPr lang="pl-PL" dirty="0" smtClean="0"/>
           </a:p>
@@ -4682,6 +4615,102 @@
             <a:avLst/>
           </a:prstGeom>
           <a:noFill/>
+        </p:spPr>
+      </p:pic>
+    </p:spTree>
+  </p:cSld>
+  <p:clrMapOvr>
+    <a:masterClrMapping/>
+  </p:clrMapOvr>
+</p:sld>
+</file>
+
+<file path=ppt/slides/slide6.xml><?xml version="1.0" encoding="utf-8"?>
+<p:sld xmlns:a="http://schemas.openxmlformats.org/drawingml/2006/main" xmlns:r="http://schemas.openxmlformats.org/officeDocument/2006/relationships" xmlns:p="http://schemas.openxmlformats.org/presentationml/2006/main">
+  <p:cSld>
+    <p:spTree>
+      <p:nvGrpSpPr>
+        <p:cNvPr id="1" name=""/>
+        <p:cNvGrpSpPr/>
+        <p:nvPr/>
+      </p:nvGrpSpPr>
+      <p:grpSpPr>
+        <a:xfrm>
+          <a:off x="0" y="0"/>
+          <a:ext cx="0" cy="0"/>
+          <a:chOff x="0" y="0"/>
+          <a:chExt cx="0" cy="0"/>
+        </a:xfrm>
+      </p:grpSpPr>
+      <p:sp>
+        <p:nvSpPr>
+          <p:cNvPr id="2" name="Tytuł 1"/>
+          <p:cNvSpPr>
+            <a:spLocks noGrp="1"/>
+          </p:cNvSpPr>
+          <p:nvPr>
+            <p:ph type="title"/>
+          </p:nvPr>
+        </p:nvSpPr>
+        <p:spPr/>
+        <p:txBody>
+          <a:bodyPr/>
+          <a:lstStyle/>
+          <a:p>
+            <a:endParaRPr lang="pl-PL"/>
+          </a:p>
+        </p:txBody>
+      </p:sp>
+      <p:sp>
+        <p:nvSpPr>
+          <p:cNvPr id="3" name="Symbol zastępczy zawartości 2"/>
+          <p:cNvSpPr>
+            <a:spLocks noGrp="1"/>
+          </p:cNvSpPr>
+          <p:nvPr>
+            <p:ph idx="1"/>
+          </p:nvPr>
+        </p:nvSpPr>
+        <p:spPr/>
+        <p:txBody>
+          <a:bodyPr/>
+          <a:lstStyle/>
+          <a:p>
+            <a:endParaRPr lang="pl-PL"/>
+          </a:p>
+        </p:txBody>
+      </p:sp>
+      <p:pic>
+        <p:nvPicPr>
+          <p:cNvPr id="1026" name="Picture 2"/>
+          <p:cNvPicPr>
+            <a:picLocks noChangeAspect="1" noChangeArrowheads="1"/>
+          </p:cNvPicPr>
+          <p:nvPr/>
+        </p:nvPicPr>
+        <p:blipFill>
+          <a:blip r:embed="rId2"/>
+          <a:srcRect/>
+          <a:stretch>
+            <a:fillRect/>
+          </a:stretch>
+        </p:blipFill>
+        <p:spPr bwMode="auto">
+          <a:xfrm>
+            <a:off x="68122" y="1"/>
+            <a:ext cx="9075877" cy="6643710"/>
+          </a:xfrm>
+          <a:prstGeom prst="rect">
+            <a:avLst/>
+          </a:prstGeom>
+          <a:noFill/>
+          <a:ln w="9525">
+            <a:noFill/>
+            <a:miter lim="800000"/>
+            <a:headEnd/>
+            <a:tailEnd/>
+          </a:ln>
+          <a:effectLst/>
         </p:spPr>
       </p:pic>
     </p:spTree>

</xml_diff>

<commit_message>
small layout changes in UI, summary in raport2, presentation
</commit_message>
<xml_diff>
--- a/doku/Presentation.pptx
+++ b/doku/Presentation.pptx
@@ -11,6 +11,11 @@
     <p:sldId id="261" r:id="rId5"/>
     <p:sldId id="260" r:id="rId6"/>
     <p:sldId id="262" r:id="rId7"/>
+    <p:sldId id="263" r:id="rId8"/>
+    <p:sldId id="264" r:id="rId9"/>
+    <p:sldId id="265" r:id="rId10"/>
+    <p:sldId id="266" r:id="rId11"/>
+    <p:sldId id="267" r:id="rId12"/>
   </p:sldIdLst>
   <p:sldSz cx="9144000" cy="6858000" type="screen4x3"/>
   <p:notesSz cx="6858000" cy="9144000"/>
@@ -286,7 +291,7 @@
             <a:fld id="{66221E02-25CB-4963-84BC-0813985E7D90}" type="datetimeFigureOut">
               <a:rPr lang="pl-PL" smtClean="0"/>
               <a:pPr/>
-              <a:t>2018-01-06</a:t>
+              <a:t>2018-01-09</a:t>
             </a:fld>
             <a:endParaRPr lang="pl-PL"/>
           </a:p>
@@ -453,7 +458,7 @@
             <a:fld id="{66221E02-25CB-4963-84BC-0813985E7D90}" type="datetimeFigureOut">
               <a:rPr lang="pl-PL" smtClean="0"/>
               <a:pPr/>
-              <a:t>2018-01-06</a:t>
+              <a:t>2018-01-09</a:t>
             </a:fld>
             <a:endParaRPr lang="pl-PL"/>
           </a:p>
@@ -630,7 +635,7 @@
             <a:fld id="{66221E02-25CB-4963-84BC-0813985E7D90}" type="datetimeFigureOut">
               <a:rPr lang="pl-PL" smtClean="0"/>
               <a:pPr/>
-              <a:t>2018-01-06</a:t>
+              <a:t>2018-01-09</a:t>
             </a:fld>
             <a:endParaRPr lang="pl-PL"/>
           </a:p>
@@ -797,7 +802,7 @@
             <a:fld id="{66221E02-25CB-4963-84BC-0813985E7D90}" type="datetimeFigureOut">
               <a:rPr lang="pl-PL" smtClean="0"/>
               <a:pPr/>
-              <a:t>2018-01-06</a:t>
+              <a:t>2018-01-09</a:t>
             </a:fld>
             <a:endParaRPr lang="pl-PL"/>
           </a:p>
@@ -1041,7 +1046,7 @@
             <a:fld id="{66221E02-25CB-4963-84BC-0813985E7D90}" type="datetimeFigureOut">
               <a:rPr lang="pl-PL" smtClean="0"/>
               <a:pPr/>
-              <a:t>2018-01-06</a:t>
+              <a:t>2018-01-09</a:t>
             </a:fld>
             <a:endParaRPr lang="pl-PL"/>
           </a:p>
@@ -1307,7 +1312,7 @@
             <a:fld id="{66221E02-25CB-4963-84BC-0813985E7D90}" type="datetimeFigureOut">
               <a:rPr lang="pl-PL" smtClean="0"/>
               <a:pPr/>
-              <a:t>2018-01-06</a:t>
+              <a:t>2018-01-09</a:t>
             </a:fld>
             <a:endParaRPr lang="pl-PL"/>
           </a:p>
@@ -1687,7 +1692,7 @@
             <a:fld id="{66221E02-25CB-4963-84BC-0813985E7D90}" type="datetimeFigureOut">
               <a:rPr lang="pl-PL" smtClean="0"/>
               <a:pPr/>
-              <a:t>2018-01-06</a:t>
+              <a:t>2018-01-09</a:t>
             </a:fld>
             <a:endParaRPr lang="pl-PL"/>
           </a:p>
@@ -1839,7 +1844,7 @@
             <a:fld id="{66221E02-25CB-4963-84BC-0813985E7D90}" type="datetimeFigureOut">
               <a:rPr lang="pl-PL" smtClean="0"/>
               <a:pPr/>
-              <a:t>2018-01-06</a:t>
+              <a:t>2018-01-09</a:t>
             </a:fld>
             <a:endParaRPr lang="pl-PL"/>
           </a:p>
@@ -1931,7 +1936,7 @@
             <a:fld id="{66221E02-25CB-4963-84BC-0813985E7D90}" type="datetimeFigureOut">
               <a:rPr lang="pl-PL" smtClean="0"/>
               <a:pPr/>
-              <a:t>2018-01-06</a:t>
+              <a:t>2018-01-09</a:t>
             </a:fld>
             <a:endParaRPr lang="pl-PL"/>
           </a:p>
@@ -2194,7 +2199,7 @@
             <a:fld id="{66221E02-25CB-4963-84BC-0813985E7D90}" type="datetimeFigureOut">
               <a:rPr lang="pl-PL" smtClean="0"/>
               <a:pPr/>
-              <a:t>2018-01-06</a:t>
+              <a:t>2018-01-09</a:t>
             </a:fld>
             <a:endParaRPr lang="pl-PL"/>
           </a:p>
@@ -2484,7 +2489,7 @@
             <a:fld id="{66221E02-25CB-4963-84BC-0813985E7D90}" type="datetimeFigureOut">
               <a:rPr lang="pl-PL" smtClean="0"/>
               <a:pPr/>
-              <a:t>2018-01-06</a:t>
+              <a:t>2018-01-09</a:t>
             </a:fld>
             <a:endParaRPr lang="pl-PL"/>
           </a:p>
@@ -3257,7 +3262,7 @@
             <a:fld id="{66221E02-25CB-4963-84BC-0813985E7D90}" type="datetimeFigureOut">
               <a:rPr lang="pl-PL" smtClean="0"/>
               <a:pPr/>
-              <a:t>2018-01-06</a:t>
+              <a:t>2018-01-09</a:t>
             </a:fld>
             <a:endParaRPr lang="pl-PL"/>
           </a:p>
@@ -3949,6 +3954,148 @@
   <p:clrMapOvr>
     <a:masterClrMapping/>
   </p:clrMapOvr>
+  <p:timing>
+    <p:tnLst>
+      <p:par>
+        <p:cTn id="1" dur="indefinite" restart="never" nodeType="tmRoot"/>
+      </p:par>
+    </p:tnLst>
+  </p:timing>
+</p:sld>
+</file>
+
+<file path=ppt/slides/slide10.xml><?xml version="1.0" encoding="utf-8"?>
+<p:sld xmlns:a="http://schemas.openxmlformats.org/drawingml/2006/main" xmlns:r="http://schemas.openxmlformats.org/officeDocument/2006/relationships" xmlns:p="http://schemas.openxmlformats.org/presentationml/2006/main">
+  <p:cSld>
+    <p:spTree>
+      <p:nvGrpSpPr>
+        <p:cNvPr id="1" name=""/>
+        <p:cNvGrpSpPr/>
+        <p:nvPr/>
+      </p:nvGrpSpPr>
+      <p:grpSpPr>
+        <a:xfrm>
+          <a:off x="0" y="0"/>
+          <a:ext cx="0" cy="0"/>
+          <a:chOff x="0" y="0"/>
+          <a:chExt cx="0" cy="0"/>
+        </a:xfrm>
+      </p:grpSpPr>
+      <p:sp>
+        <p:nvSpPr>
+          <p:cNvPr id="2" name="Tytuł 1"/>
+          <p:cNvSpPr>
+            <a:spLocks noGrp="1"/>
+          </p:cNvSpPr>
+          <p:nvPr>
+            <p:ph type="title"/>
+          </p:nvPr>
+        </p:nvSpPr>
+        <p:spPr/>
+        <p:txBody>
+          <a:bodyPr/>
+          <a:lstStyle/>
+          <a:p>
+            <a:endParaRPr lang="pl-PL"/>
+          </a:p>
+        </p:txBody>
+      </p:sp>
+      <p:pic>
+        <p:nvPicPr>
+          <p:cNvPr id="4" name="Symbol zastępczy zawartości 3" descr="Screen Shot 01-09-18 at 04.11 PM.PNG"/>
+          <p:cNvPicPr>
+            <a:picLocks noGrp="1" noChangeAspect="1"/>
+          </p:cNvPicPr>
+          <p:nvPr>
+            <p:ph idx="1"/>
+          </p:nvPr>
+        </p:nvPicPr>
+        <p:blipFill>
+          <a:blip r:embed="rId2"/>
+          <a:stretch>
+            <a:fillRect/>
+          </a:stretch>
+        </p:blipFill>
+        <p:spPr>
+          <a:xfrm>
+            <a:off x="36813" y="1785926"/>
+            <a:ext cx="9122611" cy="4714908"/>
+          </a:xfrm>
+        </p:spPr>
+      </p:pic>
+    </p:spTree>
+  </p:cSld>
+  <p:clrMapOvr>
+    <a:masterClrMapping/>
+  </p:clrMapOvr>
+  <p:timing>
+    <p:tnLst>
+      <p:par>
+        <p:cTn id="1" dur="indefinite" restart="never" nodeType="tmRoot"/>
+      </p:par>
+    </p:tnLst>
+  </p:timing>
+</p:sld>
+</file>
+
+<file path=ppt/slides/slide11.xml><?xml version="1.0" encoding="utf-8"?>
+<p:sld xmlns:a="http://schemas.openxmlformats.org/drawingml/2006/main" xmlns:r="http://schemas.openxmlformats.org/officeDocument/2006/relationships" xmlns:p="http://schemas.openxmlformats.org/presentationml/2006/main">
+  <p:cSld>
+    <p:spTree>
+      <p:nvGrpSpPr>
+        <p:cNvPr id="1" name=""/>
+        <p:cNvGrpSpPr/>
+        <p:nvPr/>
+      </p:nvGrpSpPr>
+      <p:grpSpPr>
+        <a:xfrm>
+          <a:off x="0" y="0"/>
+          <a:ext cx="0" cy="0"/>
+          <a:chOff x="0" y="0"/>
+          <a:chExt cx="0" cy="0"/>
+        </a:xfrm>
+      </p:grpSpPr>
+      <p:sp>
+        <p:nvSpPr>
+          <p:cNvPr id="2" name="Tytuł 1"/>
+          <p:cNvSpPr>
+            <a:spLocks noGrp="1"/>
+          </p:cNvSpPr>
+          <p:nvPr>
+            <p:ph type="ctrTitle"/>
+          </p:nvPr>
+        </p:nvSpPr>
+        <p:spPr>
+          <a:xfrm>
+            <a:off x="571472" y="2357430"/>
+            <a:ext cx="7851648" cy="1828800"/>
+          </a:xfrm>
+        </p:spPr>
+        <p:txBody>
+          <a:bodyPr/>
+          <a:lstStyle/>
+          <a:p>
+            <a:pPr algn="ctr"/>
+            <a:r>
+              <a:rPr lang="pl-PL" dirty="0" smtClean="0"/>
+              <a:t>THANK YOU FOR YOUR ATTENTION</a:t>
+            </a:r>
+            <a:endParaRPr lang="pl-PL" dirty="0"/>
+          </a:p>
+        </p:txBody>
+      </p:sp>
+    </p:spTree>
+  </p:cSld>
+  <p:clrMapOvr>
+    <a:masterClrMapping/>
+  </p:clrMapOvr>
+  <p:timing>
+    <p:tnLst>
+      <p:par>
+        <p:cTn id="1" dur="indefinite" restart="never" nodeType="tmRoot"/>
+      </p:par>
+    </p:tnLst>
+  </p:timing>
 </p:sld>
 </file>
 
@@ -4181,6 +4328,13 @@
   <p:clrMapOvr>
     <a:masterClrMapping/>
   </p:clrMapOvr>
+  <p:timing>
+    <p:tnLst>
+      <p:par>
+        <p:cTn id="1" dur="indefinite" restart="never" nodeType="tmRoot"/>
+      </p:par>
+    </p:tnLst>
+  </p:timing>
 </p:sld>
 </file>
 
@@ -4280,7 +4434,79 @@
             </a:r>
             <a:r>
               <a:rPr lang="en-US" dirty="0" smtClean="0"/>
-              <a:t>many factors</a:t>
+              <a:t>many </a:t>
+            </a:r>
+            <a:r>
+              <a:rPr lang="en-US" dirty="0" smtClean="0"/>
+              <a:t>factors</a:t>
+            </a:r>
+            <a:r>
+              <a:rPr lang="pl-PL" dirty="0" smtClean="0"/>
+              <a:t>(</a:t>
+            </a:r>
+            <a:r>
+              <a:rPr lang="pl-PL" dirty="0" err="1" smtClean="0"/>
+              <a:t>recovery</a:t>
+            </a:r>
+            <a:r>
+              <a:rPr lang="pl-PL" dirty="0" smtClean="0"/>
+              <a:t> </a:t>
+            </a:r>
+            <a:r>
+              <a:rPr lang="pl-PL" dirty="0" err="1" smtClean="0"/>
+              <a:t>rate</a:t>
+            </a:r>
+            <a:r>
+              <a:rPr lang="pl-PL" dirty="0" smtClean="0"/>
+              <a:t>, </a:t>
+            </a:r>
+            <a:r>
+              <a:rPr lang="pl-PL" dirty="0" err="1" smtClean="0"/>
+              <a:t>vaccination</a:t>
+            </a:r>
+            <a:r>
+              <a:rPr lang="pl-PL" dirty="0" smtClean="0"/>
+              <a:t> </a:t>
+            </a:r>
+            <a:r>
+              <a:rPr lang="pl-PL" dirty="0" err="1" smtClean="0"/>
+              <a:t>rate</a:t>
+            </a:r>
+            <a:r>
+              <a:rPr lang="pl-PL" dirty="0" smtClean="0"/>
+              <a:t>, </a:t>
+            </a:r>
+            <a:r>
+              <a:rPr lang="pl-PL" dirty="0" err="1" smtClean="0"/>
+              <a:t>virulence</a:t>
+            </a:r>
+            <a:r>
+              <a:rPr lang="pl-PL" dirty="0" smtClean="0"/>
+              <a:t> of </a:t>
+            </a:r>
+            <a:r>
+              <a:rPr lang="pl-PL" dirty="0" err="1" smtClean="0"/>
+              <a:t>epidemic</a:t>
+            </a:r>
+            <a:r>
+              <a:rPr lang="pl-PL" dirty="0" smtClean="0"/>
+              <a:t>, </a:t>
+            </a:r>
+            <a:r>
+              <a:rPr lang="pl-PL" dirty="0" err="1" smtClean="0"/>
+              <a:t>movement</a:t>
+            </a:r>
+            <a:r>
+              <a:rPr lang="pl-PL" dirty="0" smtClean="0"/>
+              <a:t> </a:t>
+            </a:r>
+            <a:r>
+              <a:rPr lang="pl-PL" dirty="0" err="1" smtClean="0"/>
+              <a:t>factor</a:t>
+            </a:r>
+            <a:r>
+              <a:rPr lang="pl-PL" dirty="0" smtClean="0"/>
+              <a:t>)</a:t>
             </a:r>
             <a:endParaRPr lang="pl-PL" dirty="0" smtClean="0"/>
           </a:p>
@@ -4331,16 +4557,13 @@
             </a:r>
             <a:r>
               <a:rPr lang="en-US" dirty="0" smtClean="0"/>
-              <a:t> that herd immunity is important</a:t>
+              <a:t> that herd immunity is </a:t>
+            </a:r>
+            <a:r>
+              <a:rPr lang="en-US" dirty="0" smtClean="0"/>
+              <a:t>important</a:t>
             </a:r>
             <a:endParaRPr lang="pl-PL" dirty="0" smtClean="0"/>
-          </a:p>
-          <a:p>
-            <a:r>
-              <a:rPr lang="pl-PL" dirty="0" smtClean="0"/>
-              <a:t>Skuteczność szczepionek</a:t>
-            </a:r>
-            <a:endParaRPr lang="pl-PL" dirty="0"/>
           </a:p>
         </p:txBody>
       </p:sp>
@@ -4349,6 +4572,13 @@
   <p:clrMapOvr>
     <a:masterClrMapping/>
   </p:clrMapOvr>
+  <p:timing>
+    <p:tnLst>
+      <p:par>
+        <p:cTn id="1" dur="indefinite" restart="never" nodeType="tmRoot"/>
+      </p:par>
+    </p:tnLst>
+  </p:timing>
 </p:sld>
 </file>
 
@@ -4548,6 +4778,13 @@
   <p:clrMapOvr>
     <a:masterClrMapping/>
   </p:clrMapOvr>
+  <p:timing>
+    <p:tnLst>
+      <p:par>
+        <p:cTn id="1" dur="indefinite" restart="never" nodeType="tmRoot"/>
+      </p:par>
+    </p:tnLst>
+  </p:timing>
 </p:sld>
 </file>
 
@@ -4578,7 +4815,12 @@
             <p:ph type="title"/>
           </p:nvPr>
         </p:nvSpPr>
-        <p:spPr/>
+        <p:spPr>
+          <a:xfrm>
+            <a:off x="914400" y="0"/>
+            <a:ext cx="8229600" cy="1143000"/>
+          </a:xfrm>
+        </p:spPr>
         <p:txBody>
           <a:bodyPr/>
           <a:lstStyle/>
@@ -4593,28 +4835,26 @@
       </p:sp>
       <p:pic>
         <p:nvPicPr>
-          <p:cNvPr id="3074" name="Picture 2" descr="C:\Users\Amras\Documents\GIT\agentsProjekt\doku\GUI3.PNG"/>
+          <p:cNvPr id="4" name="Obraz 3" descr="Screen Shot 01-09-18 at 04.09 PM.PNG"/>
           <p:cNvPicPr>
-            <a:picLocks noChangeAspect="1" noChangeArrowheads="1"/>
+            <a:picLocks noChangeAspect="1"/>
           </p:cNvPicPr>
           <p:nvPr/>
         </p:nvPicPr>
         <p:blipFill>
           <a:blip r:embed="rId2"/>
-          <a:srcRect/>
           <a:stretch>
             <a:fillRect/>
           </a:stretch>
         </p:blipFill>
-        <p:spPr bwMode="auto">
+        <p:spPr>
           <a:xfrm>
-            <a:off x="2846387" y="1181100"/>
-            <a:ext cx="6297613" cy="5676900"/>
+            <a:off x="1008514" y="1094570"/>
+            <a:ext cx="8135486" cy="5763430"/>
           </a:xfrm>
           <a:prstGeom prst="rect">
             <a:avLst/>
           </a:prstGeom>
-          <a:noFill/>
         </p:spPr>
       </p:pic>
     </p:spTree>
@@ -4622,6 +4862,13 @@
   <p:clrMapOvr>
     <a:masterClrMapping/>
   </p:clrMapOvr>
+  <p:timing>
+    <p:tnLst>
+      <p:par>
+        <p:cTn id="1" dur="indefinite" restart="never" nodeType="tmRoot"/>
+      </p:par>
+    </p:tnLst>
+  </p:timing>
 </p:sld>
 </file>
 
@@ -4661,56 +4908,27 @@
           </a:p>
         </p:txBody>
       </p:sp>
-      <p:sp>
-        <p:nvSpPr>
-          <p:cNvPr id="3" name="Symbol zastępczy zawartości 2"/>
-          <p:cNvSpPr>
-            <a:spLocks noGrp="1"/>
-          </p:cNvSpPr>
-          <p:nvPr>
-            <p:ph idx="1"/>
-          </p:nvPr>
-        </p:nvSpPr>
-        <p:spPr/>
-        <p:txBody>
-          <a:bodyPr/>
-          <a:lstStyle/>
-          <a:p>
-            <a:endParaRPr lang="pl-PL"/>
-          </a:p>
-        </p:txBody>
-      </p:sp>
       <p:pic>
         <p:nvPicPr>
-          <p:cNvPr id="1026" name="Picture 2"/>
+          <p:cNvPr id="5" name="Symbol zastępczy zawartości 4" descr="Screen Shot 01-09-18 at 04.09 PM 001.PNG"/>
           <p:cNvPicPr>
-            <a:picLocks noChangeAspect="1" noChangeArrowheads="1"/>
+            <a:picLocks noGrp="1" noChangeAspect="1"/>
           </p:cNvPicPr>
-          <p:nvPr/>
+          <p:nvPr>
+            <p:ph idx="1"/>
+          </p:nvPr>
         </p:nvPicPr>
         <p:blipFill>
           <a:blip r:embed="rId2"/>
-          <a:srcRect/>
           <a:stretch>
             <a:fillRect/>
           </a:stretch>
         </p:blipFill>
-        <p:spPr bwMode="auto">
+        <p:spPr>
           <a:xfrm>
-            <a:off x="68122" y="1"/>
-            <a:ext cx="9075877" cy="6643710"/>
+            <a:off x="-9182" y="373603"/>
+            <a:ext cx="9153182" cy="6484397"/>
           </a:xfrm>
-          <a:prstGeom prst="rect">
-            <a:avLst/>
-          </a:prstGeom>
-          <a:noFill/>
-          <a:ln w="9525">
-            <a:noFill/>
-            <a:miter lim="800000"/>
-            <a:headEnd/>
-            <a:tailEnd/>
-          </a:ln>
-          <a:effectLst/>
         </p:spPr>
       </p:pic>
     </p:spTree>
@@ -4718,6 +4936,235 @@
   <p:clrMapOvr>
     <a:masterClrMapping/>
   </p:clrMapOvr>
+  <p:timing>
+    <p:tnLst>
+      <p:par>
+        <p:cTn id="1" dur="indefinite" restart="never" nodeType="tmRoot"/>
+      </p:par>
+    </p:tnLst>
+  </p:timing>
+</p:sld>
+</file>
+
+<file path=ppt/slides/slide7.xml><?xml version="1.0" encoding="utf-8"?>
+<p:sld xmlns:a="http://schemas.openxmlformats.org/drawingml/2006/main" xmlns:r="http://schemas.openxmlformats.org/officeDocument/2006/relationships" xmlns:p="http://schemas.openxmlformats.org/presentationml/2006/main">
+  <p:cSld>
+    <p:spTree>
+      <p:nvGrpSpPr>
+        <p:cNvPr id="1" name=""/>
+        <p:cNvGrpSpPr/>
+        <p:nvPr/>
+      </p:nvGrpSpPr>
+      <p:grpSpPr>
+        <a:xfrm>
+          <a:off x="0" y="0"/>
+          <a:ext cx="0" cy="0"/>
+          <a:chOff x="0" y="0"/>
+          <a:chExt cx="0" cy="0"/>
+        </a:xfrm>
+      </p:grpSpPr>
+      <p:sp>
+        <p:nvSpPr>
+          <p:cNvPr id="2" name="Tytuł 1"/>
+          <p:cNvSpPr>
+            <a:spLocks noGrp="1"/>
+          </p:cNvSpPr>
+          <p:nvPr>
+            <p:ph type="title"/>
+          </p:nvPr>
+        </p:nvSpPr>
+        <p:spPr/>
+        <p:txBody>
+          <a:bodyPr/>
+          <a:lstStyle/>
+          <a:p>
+            <a:endParaRPr lang="pl-PL"/>
+          </a:p>
+        </p:txBody>
+      </p:sp>
+      <p:pic>
+        <p:nvPicPr>
+          <p:cNvPr id="4" name="Symbol zastępczy zawartości 3" descr="Screen Shot 01-09-18 at 04.10 PM.PNG"/>
+          <p:cNvPicPr>
+            <a:picLocks noGrp="1" noChangeAspect="1"/>
+          </p:cNvPicPr>
+          <p:nvPr>
+            <p:ph idx="1"/>
+          </p:nvPr>
+        </p:nvPicPr>
+        <p:blipFill>
+          <a:blip r:embed="rId2"/>
+          <a:stretch>
+            <a:fillRect/>
+          </a:stretch>
+        </p:blipFill>
+        <p:spPr>
+          <a:xfrm>
+            <a:off x="0" y="380107"/>
+            <a:ext cx="9144000" cy="6477893"/>
+          </a:xfrm>
+        </p:spPr>
+      </p:pic>
+    </p:spTree>
+  </p:cSld>
+  <p:clrMapOvr>
+    <a:masterClrMapping/>
+  </p:clrMapOvr>
+  <p:timing>
+    <p:tnLst>
+      <p:par>
+        <p:cTn id="1" dur="indefinite" restart="never" nodeType="tmRoot"/>
+      </p:par>
+    </p:tnLst>
+  </p:timing>
+</p:sld>
+</file>
+
+<file path=ppt/slides/slide8.xml><?xml version="1.0" encoding="utf-8"?>
+<p:sld xmlns:a="http://schemas.openxmlformats.org/drawingml/2006/main" xmlns:r="http://schemas.openxmlformats.org/officeDocument/2006/relationships" xmlns:p="http://schemas.openxmlformats.org/presentationml/2006/main">
+  <p:cSld>
+    <p:spTree>
+      <p:nvGrpSpPr>
+        <p:cNvPr id="1" name=""/>
+        <p:cNvGrpSpPr/>
+        <p:nvPr/>
+      </p:nvGrpSpPr>
+      <p:grpSpPr>
+        <a:xfrm>
+          <a:off x="0" y="0"/>
+          <a:ext cx="0" cy="0"/>
+          <a:chOff x="0" y="0"/>
+          <a:chExt cx="0" cy="0"/>
+        </a:xfrm>
+      </p:grpSpPr>
+      <p:sp>
+        <p:nvSpPr>
+          <p:cNvPr id="2" name="Tytuł 1"/>
+          <p:cNvSpPr>
+            <a:spLocks noGrp="1"/>
+          </p:cNvSpPr>
+          <p:nvPr>
+            <p:ph type="title"/>
+          </p:nvPr>
+        </p:nvSpPr>
+        <p:spPr/>
+        <p:txBody>
+          <a:bodyPr/>
+          <a:lstStyle/>
+          <a:p>
+            <a:endParaRPr lang="pl-PL"/>
+          </a:p>
+        </p:txBody>
+      </p:sp>
+      <p:pic>
+        <p:nvPicPr>
+          <p:cNvPr id="4" name="Symbol zastępczy zawartości 3" descr="Screen Shot 01-09-18 at 04.10 PM 001.PNG"/>
+          <p:cNvPicPr>
+            <a:picLocks noGrp="1" noChangeAspect="1"/>
+          </p:cNvPicPr>
+          <p:nvPr>
+            <p:ph idx="1"/>
+          </p:nvPr>
+        </p:nvPicPr>
+        <p:blipFill>
+          <a:blip r:embed="rId2"/>
+          <a:stretch>
+            <a:fillRect/>
+          </a:stretch>
+        </p:blipFill>
+        <p:spPr>
+          <a:xfrm>
+            <a:off x="1" y="380107"/>
+            <a:ext cx="9144000" cy="6477893"/>
+          </a:xfrm>
+        </p:spPr>
+      </p:pic>
+    </p:spTree>
+  </p:cSld>
+  <p:clrMapOvr>
+    <a:masterClrMapping/>
+  </p:clrMapOvr>
+  <p:timing>
+    <p:tnLst>
+      <p:par>
+        <p:cTn id="1" dur="indefinite" restart="never" nodeType="tmRoot"/>
+      </p:par>
+    </p:tnLst>
+  </p:timing>
+</p:sld>
+</file>
+
+<file path=ppt/slides/slide9.xml><?xml version="1.0" encoding="utf-8"?>
+<p:sld xmlns:a="http://schemas.openxmlformats.org/drawingml/2006/main" xmlns:r="http://schemas.openxmlformats.org/officeDocument/2006/relationships" xmlns:p="http://schemas.openxmlformats.org/presentationml/2006/main">
+  <p:cSld>
+    <p:spTree>
+      <p:nvGrpSpPr>
+        <p:cNvPr id="1" name=""/>
+        <p:cNvGrpSpPr/>
+        <p:nvPr/>
+      </p:nvGrpSpPr>
+      <p:grpSpPr>
+        <a:xfrm>
+          <a:off x="0" y="0"/>
+          <a:ext cx="0" cy="0"/>
+          <a:chOff x="0" y="0"/>
+          <a:chExt cx="0" cy="0"/>
+        </a:xfrm>
+      </p:grpSpPr>
+      <p:sp>
+        <p:nvSpPr>
+          <p:cNvPr id="2" name="Tytuł 1"/>
+          <p:cNvSpPr>
+            <a:spLocks noGrp="1"/>
+          </p:cNvSpPr>
+          <p:nvPr>
+            <p:ph type="title"/>
+          </p:nvPr>
+        </p:nvSpPr>
+        <p:spPr/>
+        <p:txBody>
+          <a:bodyPr/>
+          <a:lstStyle/>
+          <a:p>
+            <a:endParaRPr lang="pl-PL"/>
+          </a:p>
+        </p:txBody>
+      </p:sp>
+      <p:pic>
+        <p:nvPicPr>
+          <p:cNvPr id="4" name="Symbol zastępczy zawartości 3" descr="Screen Shot 01-09-18 at 04.10 PM 002.PNG"/>
+          <p:cNvPicPr>
+            <a:picLocks noGrp="1" noChangeAspect="1"/>
+          </p:cNvPicPr>
+          <p:nvPr>
+            <p:ph idx="1"/>
+          </p:nvPr>
+        </p:nvPicPr>
+        <p:blipFill>
+          <a:blip r:embed="rId2"/>
+          <a:stretch>
+            <a:fillRect/>
+          </a:stretch>
+        </p:blipFill>
+        <p:spPr>
+          <a:xfrm>
+            <a:off x="0" y="380107"/>
+            <a:ext cx="9144000" cy="6477893"/>
+          </a:xfrm>
+        </p:spPr>
+      </p:pic>
+    </p:spTree>
+  </p:cSld>
+  <p:clrMapOvr>
+    <a:masterClrMapping/>
+  </p:clrMapOvr>
+  <p:timing>
+    <p:tnLst>
+      <p:par>
+        <p:cTn id="1" dur="indefinite" restart="never" nodeType="tmRoot"/>
+      </p:par>
+    </p:tnLst>
+  </p:timing>
 </p:sld>
 </file>
 

</xml_diff>